<commit_message>
modify model class diagram
</commit_message>
<xml_diff>
--- a/docs/diagrams/CreateJioCommandSequenceDiagram.pptx
+++ b/docs/diagrams/CreateJioCommandSequenceDiagram.pptx
@@ -3488,14 +3488,14 @@
           <a:lstStyle/>
           <a:p>
             <a:r>
-              <a:rPr lang="en-US" sz="1200" b="1" dirty="0">
+              <a:rPr lang="en-US" sz="1200" b="1">
                 <a:solidFill>
                   <a:srgbClr val="7030A0"/>
                 </a:solidFill>
               </a:rPr>
               <a:t>Model</a:t>
             </a:r>
-            <a:endParaRPr lang="en-SG" sz="1200" b="1" dirty="0">
+            <a:endParaRPr lang="en-SG" sz="1200" b="1">
               <a:solidFill>
                 <a:srgbClr val="7030A0"/>
               </a:solidFill>
@@ -3549,14 +3549,14 @@
           <a:lstStyle/>
           <a:p>
             <a:r>
-              <a:rPr lang="en-US" sz="1200" b="1" dirty="0">
+              <a:rPr lang="en-US" sz="1200" b="1">
                 <a:solidFill>
                   <a:srgbClr val="0070C0"/>
                 </a:solidFill>
               </a:rPr>
               <a:t>Logic</a:t>
             </a:r>
-            <a:endParaRPr lang="en-SG" sz="1200" b="1" dirty="0">
+            <a:endParaRPr lang="en-SG" sz="1200" b="1">
               <a:solidFill>
                 <a:srgbClr val="0070C0"/>
               </a:solidFill>
@@ -3608,22 +3608,14 @@
           <a:p>
             <a:pPr algn="ctr"/>
             <a:r>
-              <a:rPr lang="en-US" sz="1600" dirty="0">
+              <a:rPr lang="en-US" sz="1600">
                 <a:solidFill>
                   <a:schemeClr val="bg1"/>
                 </a:solidFill>
               </a:rPr>
-              <a:t>:</a:t>
-            </a:r>
-            <a:r>
-              <a:rPr lang="en-US" sz="1600" dirty="0" err="1">
-                <a:solidFill>
-                  <a:schemeClr val="bg1"/>
-                </a:solidFill>
-              </a:rPr>
-              <a:t>LogicManager</a:t>
-            </a:r>
-            <a:endParaRPr lang="en-SG" sz="1600" dirty="0">
+              <a:t>:LogicManager</a:t>
+            </a:r>
+            <a:endParaRPr lang="en-SG" sz="1600">
               <a:solidFill>
                 <a:schemeClr val="bg1"/>
               </a:solidFill>
@@ -3761,7 +3753,7 @@
           <a:p>
             <a:pPr algn="ctr"/>
             <a:r>
-              <a:rPr lang="en-US" sz="1600" dirty="0">
+              <a:rPr lang="en-US" sz="1600">
                 <a:solidFill>
                   <a:schemeClr val="bg1"/>
                 </a:solidFill>
@@ -3772,14 +3764,14 @@
           <a:p>
             <a:pPr algn="ctr"/>
             <a:r>
-              <a:rPr lang="en-US" sz="1600" dirty="0" err="1">
+              <a:rPr lang="en-US" sz="1600">
                 <a:solidFill>
                   <a:schemeClr val="bg1"/>
                 </a:solidFill>
               </a:rPr>
               <a:t>BookParser</a:t>
             </a:r>
-            <a:endParaRPr lang="en-SG" sz="1600" dirty="0">
+            <a:endParaRPr lang="en-SG" sz="1600">
               <a:solidFill>
                 <a:schemeClr val="bg1"/>
               </a:solidFill>
@@ -4024,28 +4016,12 @@
           <a:p>
             <a:pPr algn="r"/>
             <a:r>
-              <a:rPr lang="en-US" sz="1400" dirty="0">
+              <a:rPr lang="en-US" sz="1400">
                 <a:solidFill>
                   <a:srgbClr val="0070C0"/>
                 </a:solidFill>
               </a:rPr>
-              <a:t>execute(“</a:t>
-            </a:r>
-            <a:r>
-              <a:rPr lang="en-US" sz="1400" dirty="0" err="1">
-                <a:solidFill>
-                  <a:srgbClr val="0070C0"/>
-                </a:solidFill>
-              </a:rPr>
-              <a:t>createJio</a:t>
-            </a:r>
-            <a:r>
-              <a:rPr lang="en-US" sz="1400" dirty="0">
-                <a:solidFill>
-                  <a:srgbClr val="0070C0"/>
-                </a:solidFill>
-              </a:rPr>
-              <a:t>…”)</a:t>
+              <a:t>execute(“createJio…”)</a:t>
             </a:r>
           </a:p>
         </p:txBody>
@@ -4120,7 +4096,7 @@
           </a:lstStyle>
           <a:p>
             <a:r>
-              <a:rPr lang="en-US" dirty="0"/>
+              <a:rPr lang="en-US"/>
               <a:t>execute()</a:t>
             </a:r>
           </a:p>
@@ -4323,26 +4299,16 @@
           </a:lstStyle>
           <a:p>
             <a:r>
-              <a:rPr lang="en-US" sz="1200" dirty="0" err="1">
+              <a:rPr lang="en-US" sz="1200">
                 <a:solidFill>
                   <a:schemeClr val="accent4">
                     <a:lumMod val="75000"/>
                   </a:schemeClr>
                 </a:solidFill>
               </a:rPr>
-              <a:t>createJio</a:t>
-            </a:r>
-            <a:r>
-              <a:rPr lang="en-US" sz="1200" dirty="0">
-                <a:solidFill>
-                  <a:schemeClr val="accent4">
-                    <a:lumMod val="75000"/>
-                  </a:schemeClr>
-                </a:solidFill>
-              </a:rPr>
-              <a:t>()</a:t>
-            </a:r>
-            <a:endParaRPr lang="en-US" sz="1200" dirty="0"/>
+              <a:t>createJio()</a:t>
+            </a:r>
+            <a:endParaRPr lang="en-US" sz="1200"/>
           </a:p>
         </p:txBody>
       </p:sp>
@@ -4380,23 +4346,14 @@
           </a:lstStyle>
           <a:p>
             <a:r>
-              <a:rPr lang="en-US" dirty="0" err="1"/>
+              <a:rPr lang="en-US"/>
               <a:t>parseCommand</a:t>
             </a:r>
-            <a:endParaRPr lang="en-US" dirty="0"/>
-          </a:p>
-          <a:p>
-            <a:r>
-              <a:rPr lang="en-US" dirty="0"/>
-              <a:t>(“</a:t>
-            </a:r>
-            <a:r>
-              <a:rPr lang="en-US" dirty="0" err="1"/>
-              <a:t>createJio</a:t>
-            </a:r>
-            <a:r>
-              <a:rPr lang="en-US" dirty="0"/>
-              <a:t>…”)</a:t>
+          </a:p>
+          <a:p>
+            <a:r>
+              <a:rPr lang="en-US"/>
+              <a:t>(“createJio…”)</a:t>
             </a:r>
           </a:p>
         </p:txBody>
@@ -4435,7 +4392,7 @@
           </a:lstStyle>
           <a:p>
             <a:r>
-              <a:rPr lang="en-US" dirty="0"/>
+              <a:rPr lang="en-US"/>
               <a:t>result</a:t>
             </a:r>
           </a:p>
@@ -4475,7 +4432,7 @@
           </a:lstStyle>
           <a:p>
             <a:r>
-              <a:rPr lang="en-US" dirty="0"/>
+              <a:rPr lang="en-US"/>
               <a:t>result</a:t>
             </a:r>
           </a:p>
@@ -4525,22 +4482,14 @@
           <a:p>
             <a:pPr algn="ctr"/>
             <a:r>
-              <a:rPr lang="en-US" sz="1600" dirty="0">
+              <a:rPr lang="en-US" sz="1600">
                 <a:solidFill>
                   <a:schemeClr val="bg1"/>
                 </a:solidFill>
               </a:rPr>
-              <a:t>:</a:t>
-            </a:r>
-            <a:r>
-              <a:rPr lang="en-US" sz="1600" dirty="0" err="1">
-                <a:solidFill>
-                  <a:schemeClr val="bg1"/>
-                </a:solidFill>
-              </a:rPr>
-              <a:t>UserData</a:t>
-            </a:r>
-            <a:endParaRPr lang="en-SG" sz="1600" dirty="0">
+              <a:t>:UserData</a:t>
+            </a:r>
+            <a:endParaRPr lang="en-SG" sz="1600">
               <a:solidFill>
                 <a:schemeClr val="bg1"/>
               </a:solidFill>
@@ -4629,7 +4578,7 @@
           </a:lstStyle>
           <a:p>
             <a:r>
-              <a:rPr lang="en-US" dirty="0"/>
+              <a:rPr lang="en-US"/>
               <a:t>c</a:t>
             </a:r>
           </a:p>
@@ -4679,14 +4628,14 @@
           <a:p>
             <a:pPr algn="ctr"/>
             <a:r>
-              <a:rPr lang="en-US" sz="1600" dirty="0">
+              <a:rPr lang="en-US" sz="1600">
                 <a:solidFill>
                   <a:schemeClr val="bg1"/>
                 </a:solidFill>
               </a:rPr>
               <a:t>:Model</a:t>
             </a:r>
-            <a:endParaRPr lang="en-SG" sz="1600" dirty="0">
+            <a:endParaRPr lang="en-SG" sz="1600">
               <a:solidFill>
                 <a:schemeClr val="bg1"/>
               </a:solidFill>
@@ -4841,7 +4790,7 @@
           <a:lstStyle/>
           <a:p>
             <a:r>
-              <a:rPr lang="en-SG" sz="1100" dirty="0">
+              <a:rPr lang="en-SG" sz="1100">
                 <a:solidFill>
                   <a:srgbClr val="002060"/>
                 </a:solidFill>
@@ -5128,37 +5077,29 @@
           <a:p>
             <a:pPr algn="ctr"/>
             <a:r>
-              <a:rPr lang="en-US" sz="1600" dirty="0">
+              <a:rPr lang="en-US" sz="1600">
                 <a:solidFill>
                   <a:schemeClr val="bg1"/>
                 </a:solidFill>
               </a:rPr>
-              <a:t>:</a:t>
-            </a:r>
-            <a:r>
-              <a:rPr lang="en-US" sz="1600" dirty="0" err="1">
-                <a:solidFill>
-                  <a:schemeClr val="bg1"/>
-                </a:solidFill>
-              </a:rPr>
-              <a:t>CreateJio</a:t>
+              <a:t>:CreateJio</a:t>
             </a:r>
             <a:br>
-              <a:rPr lang="en-US" sz="1600" dirty="0">
+              <a:rPr lang="en-US" sz="1600">
                 <a:solidFill>
                   <a:schemeClr val="bg1"/>
                 </a:solidFill>
               </a:rPr>
             </a:br>
             <a:r>
-              <a:rPr lang="en-US" sz="1600" dirty="0" err="1">
+              <a:rPr lang="en-US" sz="1600">
                 <a:solidFill>
                   <a:schemeClr val="bg1"/>
                 </a:solidFill>
               </a:rPr>
               <a:t>CommandParser</a:t>
             </a:r>
-            <a:endParaRPr lang="en-SG" sz="1600" dirty="0">
+            <a:endParaRPr lang="en-SG" sz="1600">
               <a:solidFill>
                 <a:schemeClr val="bg1"/>
               </a:solidFill>
@@ -5203,7 +5144,7 @@
           </a:lstStyle>
           <a:p>
             <a:r>
-              <a:rPr lang="en-US" sz="1200" dirty="0" err="1">
+              <a:rPr lang="en-US" sz="1200">
                 <a:solidFill>
                   <a:srgbClr val="7030A0"/>
                 </a:solidFill>
@@ -5211,7 +5152,7 @@
               <a:t>getAcceptedUsers</a:t>
             </a:r>
             <a:r>
-              <a:rPr lang="en-US" sz="1200" dirty="0">
+              <a:rPr lang="en-US" sz="1200">
                 <a:solidFill>
                   <a:schemeClr val="accent4">
                     <a:lumMod val="75000"/>
@@ -5455,7 +5396,7 @@
           <a:p>
             <a:pPr algn="ctr"/>
             <a:r>
-              <a:rPr lang="en-US" sz="1600" dirty="0" err="1">
+              <a:rPr lang="en-US" sz="1600">
                 <a:solidFill>
                   <a:schemeClr val="bg1"/>
                 </a:solidFill>
@@ -5463,21 +5404,21 @@
               <a:t>c:CreateJio</a:t>
             </a:r>
             <a:br>
-              <a:rPr lang="en-US" sz="1600" dirty="0">
+              <a:rPr lang="en-US" sz="1600">
                 <a:solidFill>
                   <a:schemeClr val="bg1"/>
                 </a:solidFill>
               </a:rPr>
             </a:br>
             <a:r>
-              <a:rPr lang="en-US" sz="1600" dirty="0">
+              <a:rPr lang="en-US" sz="1600">
                 <a:solidFill>
                   <a:schemeClr val="bg1"/>
                 </a:solidFill>
               </a:rPr>
               <a:t>Command</a:t>
             </a:r>
-            <a:endParaRPr lang="en-SG" sz="1600" dirty="0">
+            <a:endParaRPr lang="en-SG" sz="1600">
               <a:solidFill>
                 <a:schemeClr val="bg1"/>
               </a:solidFill>
@@ -5569,16 +5510,8 @@
           </a:lstStyle>
           <a:p>
             <a:r>
-              <a:rPr lang="en-US" dirty="0"/>
-              <a:t>parse(</a:t>
-            </a:r>
-            <a:r>
-              <a:rPr lang="en-US" dirty="0" err="1"/>
-              <a:t>arg</a:t>
-            </a:r>
-            <a:r>
-              <a:rPr lang="en-US" dirty="0"/>
-              <a:t>)</a:t>
+              <a:rPr lang="en-US"/>
+              <a:t>parse(arg)</a:t>
             </a:r>
           </a:p>
         </p:txBody>
@@ -5756,7 +5689,7 @@
           <a:lstStyle/>
           <a:p>
             <a:pPr algn="ctr"/>
-            <a:endParaRPr lang="en-US" dirty="0"/>
+            <a:endParaRPr lang="en-US"/>
           </a:p>
         </p:txBody>
       </p:sp>
@@ -5802,7 +5735,7 @@
           <a:p>
             <a:pPr algn="ctr"/>
             <a:r>
-              <a:rPr lang="en-US" dirty="0"/>
+              <a:rPr lang="en-US"/>
               <a:t>alt</a:t>
             </a:r>
           </a:p>
@@ -5837,16 +5770,8 @@
           <a:lstStyle/>
           <a:p>
             <a:r>
-              <a:rPr lang="en-US" sz="1600" dirty="0"/>
-              <a:t>[</a:t>
-            </a:r>
-            <a:r>
-              <a:rPr lang="en-US" sz="1600" dirty="0" err="1"/>
-              <a:t>groupjio</a:t>
-            </a:r>
-            <a:r>
-              <a:rPr lang="en-US" sz="1600" dirty="0"/>
-              <a:t>]</a:t>
+              <a:rPr lang="en-US" sz="1600"/>
+              <a:t>[groupjio]</a:t>
             </a:r>
           </a:p>
         </p:txBody>
@@ -5894,7 +5819,7 @@
           </a:lstStyle>
           <a:p>
             <a:r>
-              <a:rPr lang="en-US" sz="1200" dirty="0" err="1">
+              <a:rPr lang="en-US" sz="1200">
                 <a:solidFill>
                   <a:srgbClr val="7030A0"/>
                 </a:solidFill>
@@ -5902,7 +5827,7 @@
               <a:t>getGroupHashmap</a:t>
             </a:r>
             <a:r>
-              <a:rPr lang="en-US" sz="1200" dirty="0">
+              <a:rPr lang="en-US" sz="1200">
                 <a:solidFill>
                   <a:schemeClr val="accent4">
                     <a:lumMod val="75000"/>
@@ -6094,7 +6019,7 @@
           <a:p>
             <a:pPr algn="ctr"/>
             <a:r>
-              <a:rPr lang="en-US" sz="1200" dirty="0" err="1">
+              <a:rPr lang="en-US" sz="1200">
                 <a:solidFill>
                   <a:srgbClr val="7030A0"/>
                 </a:solidFill>
@@ -6102,7 +6027,7 @@
               <a:t>addJio</a:t>
             </a:r>
             <a:r>
-              <a:rPr lang="en-US" sz="1200" dirty="0">
+              <a:rPr lang="en-US" sz="1200">
                 <a:solidFill>
                   <a:schemeClr val="accent4">
                     <a:lumMod val="75000"/>
@@ -6298,7 +6223,7 @@
           <a:lstStyle/>
           <a:p>
             <a:pPr algn="ctr"/>
-            <a:endParaRPr lang="en-US" dirty="0"/>
+            <a:endParaRPr lang="en-US"/>
           </a:p>
         </p:txBody>
       </p:sp>
@@ -6331,7 +6256,7 @@
           <a:lstStyle/>
           <a:p>
             <a:r>
-              <a:rPr lang="en-US" sz="1600" dirty="0"/>
+              <a:rPr lang="en-US" sz="1600"/>
               <a:t>[else]</a:t>
             </a:r>
           </a:p>
@@ -6381,7 +6306,7 @@
           <a:p>
             <a:pPr algn="ctr"/>
             <a:r>
-              <a:rPr lang="en-US" sz="1200" dirty="0" err="1">
+              <a:rPr lang="en-US" sz="1200">
                 <a:solidFill>
                   <a:srgbClr val="7030A0"/>
                 </a:solidFill>
@@ -6389,7 +6314,7 @@
               <a:t>addJio</a:t>
             </a:r>
             <a:r>
-              <a:rPr lang="en-US" sz="1200" dirty="0">
+              <a:rPr lang="en-US" sz="1200">
                 <a:solidFill>
                   <a:schemeClr val="accent4">
                     <a:lumMod val="75000"/>

</xml_diff>